<commit_message>
analyses_model.Rmd is now the model main file
</commit_message>
<xml_diff>
--- a/plots/Presentation1.pptx
+++ b/plots/Presentation1.pptx
@@ -208,7 +208,7 @@
           <a:p>
             <a:fld id="{9BB71582-9B2D-9248-BDE4-01C91EACD5A8}" type="datetimeFigureOut">
               <a:rPr lang="en-US" smtClean="0"/>
-              <a:t>1/6/25</a:t>
+              <a:t>2/3/25</a:t>
             </a:fld>
             <a:endParaRPr lang="en-US"/>
           </a:p>
@@ -709,7 +709,7 @@
           <a:p>
             <a:fld id="{736FDBA4-B411-3947-A1AF-34EDADE44438}" type="datetimeFigureOut">
               <a:rPr lang="en-US" smtClean="0"/>
-              <a:t>1/6/25</a:t>
+              <a:t>2/3/25</a:t>
             </a:fld>
             <a:endParaRPr lang="en-US"/>
           </a:p>
@@ -909,7 +909,7 @@
           <a:p>
             <a:fld id="{736FDBA4-B411-3947-A1AF-34EDADE44438}" type="datetimeFigureOut">
               <a:rPr lang="en-US" smtClean="0"/>
-              <a:t>1/6/25</a:t>
+              <a:t>2/3/25</a:t>
             </a:fld>
             <a:endParaRPr lang="en-US"/>
           </a:p>
@@ -1119,7 +1119,7 @@
           <a:p>
             <a:fld id="{736FDBA4-B411-3947-A1AF-34EDADE44438}" type="datetimeFigureOut">
               <a:rPr lang="en-US" smtClean="0"/>
-              <a:t>1/6/25</a:t>
+              <a:t>2/3/25</a:t>
             </a:fld>
             <a:endParaRPr lang="en-US"/>
           </a:p>
@@ -1319,7 +1319,7 @@
           <a:p>
             <a:fld id="{736FDBA4-B411-3947-A1AF-34EDADE44438}" type="datetimeFigureOut">
               <a:rPr lang="en-US" smtClean="0"/>
-              <a:t>1/6/25</a:t>
+              <a:t>2/3/25</a:t>
             </a:fld>
             <a:endParaRPr lang="en-US"/>
           </a:p>
@@ -1595,7 +1595,7 @@
           <a:p>
             <a:fld id="{736FDBA4-B411-3947-A1AF-34EDADE44438}" type="datetimeFigureOut">
               <a:rPr lang="en-US" smtClean="0"/>
-              <a:t>1/6/25</a:t>
+              <a:t>2/3/25</a:t>
             </a:fld>
             <a:endParaRPr lang="en-US"/>
           </a:p>
@@ -1863,7 +1863,7 @@
           <a:p>
             <a:fld id="{736FDBA4-B411-3947-A1AF-34EDADE44438}" type="datetimeFigureOut">
               <a:rPr lang="en-US" smtClean="0"/>
-              <a:t>1/6/25</a:t>
+              <a:t>2/3/25</a:t>
             </a:fld>
             <a:endParaRPr lang="en-US"/>
           </a:p>
@@ -2278,7 +2278,7 @@
           <a:p>
             <a:fld id="{736FDBA4-B411-3947-A1AF-34EDADE44438}" type="datetimeFigureOut">
               <a:rPr lang="en-US" smtClean="0"/>
-              <a:t>1/6/25</a:t>
+              <a:t>2/3/25</a:t>
             </a:fld>
             <a:endParaRPr lang="en-US"/>
           </a:p>
@@ -2420,7 +2420,7 @@
           <a:p>
             <a:fld id="{736FDBA4-B411-3947-A1AF-34EDADE44438}" type="datetimeFigureOut">
               <a:rPr lang="en-US" smtClean="0"/>
-              <a:t>1/6/25</a:t>
+              <a:t>2/3/25</a:t>
             </a:fld>
             <a:endParaRPr lang="en-US"/>
           </a:p>
@@ -2533,7 +2533,7 @@
           <a:p>
             <a:fld id="{736FDBA4-B411-3947-A1AF-34EDADE44438}" type="datetimeFigureOut">
               <a:rPr lang="en-US" smtClean="0"/>
-              <a:t>1/6/25</a:t>
+              <a:t>2/3/25</a:t>
             </a:fld>
             <a:endParaRPr lang="en-US"/>
           </a:p>
@@ -2846,7 +2846,7 @@
           <a:p>
             <a:fld id="{736FDBA4-B411-3947-A1AF-34EDADE44438}" type="datetimeFigureOut">
               <a:rPr lang="en-US" smtClean="0"/>
-              <a:t>1/6/25</a:t>
+              <a:t>2/3/25</a:t>
             </a:fld>
             <a:endParaRPr lang="en-US"/>
           </a:p>
@@ -3135,7 +3135,7 @@
           <a:p>
             <a:fld id="{736FDBA4-B411-3947-A1AF-34EDADE44438}" type="datetimeFigureOut">
               <a:rPr lang="en-US" smtClean="0"/>
-              <a:t>1/6/25</a:t>
+              <a:t>2/3/25</a:t>
             </a:fld>
             <a:endParaRPr lang="en-US"/>
           </a:p>
@@ -3378,7 +3378,7 @@
           <a:p>
             <a:fld id="{736FDBA4-B411-3947-A1AF-34EDADE44438}" type="datetimeFigureOut">
               <a:rPr lang="en-US" smtClean="0"/>
-              <a:t>1/6/25</a:t>
+              <a:t>2/3/25</a:t>
             </a:fld>
             <a:endParaRPr lang="en-US"/>
           </a:p>
@@ -4387,8 +4387,9 @@
               </a:solidFill>
               <a:ln w="38100">
                 <a:solidFill>
-                  <a:srgbClr val="C00000"/>
+                  <a:schemeClr val="tx1"/>
                 </a:solidFill>
+                <a:prstDash val="sysDash"/>
               </a:ln>
             </p:spPr>
           </p:pic>
@@ -4537,8 +4538,9 @@
                 </a:solidFill>
                 <a:ln w="38100">
                   <a:solidFill>
-                    <a:srgbClr val="C00000"/>
+                    <a:schemeClr val="tx1"/>
                   </a:solidFill>
+                  <a:prstDash val="sysDash"/>
                 </a:ln>
               </p:spPr>
             </p:pic>
@@ -4710,8 +4712,9 @@
                   <a:grpFill/>
                   <a:ln w="38100">
                     <a:solidFill>
-                      <a:srgbClr val="C00000"/>
+                      <a:schemeClr val="tx1"/>
                     </a:solidFill>
+                    <a:prstDash val="sysDash"/>
                   </a:ln>
                 </p:spPr>
               </p:pic>
@@ -5709,8 +5712,9 @@
             </a:solidFill>
             <a:ln w="38100">
               <a:solidFill>
-                <a:srgbClr val="C00000"/>
+                <a:schemeClr val="tx1"/>
               </a:solidFill>
+              <a:prstDash val="sysDash"/>
             </a:ln>
           </p:spPr>
         </p:pic>
@@ -5840,8 +5844,9 @@
             </a:solidFill>
             <a:ln w="38100">
               <a:solidFill>
-                <a:srgbClr val="C00000"/>
+                <a:schemeClr val="tx1"/>
               </a:solidFill>
+              <a:prstDash val="sysDash"/>
             </a:ln>
           </p:spPr>
         </p:pic>
@@ -6008,8 +6013,9 @@
                 <a:grpFill/>
                 <a:ln w="38100">
                   <a:solidFill>
-                    <a:srgbClr val="C00000"/>
+                    <a:schemeClr val="tx1"/>
                   </a:solidFill>
+                  <a:prstDash val="sysDash"/>
                 </a:ln>
               </p:spPr>
             </p:pic>
@@ -6075,8 +6081,9 @@
             <a:noFill/>
             <a:ln w="38100">
               <a:solidFill>
-                <a:srgbClr val="C00000"/>
+                <a:schemeClr val="tx1"/>
               </a:solidFill>
+              <a:prstDash val="sysDash"/>
             </a:ln>
           </p:spPr>
           <p:style>
@@ -6100,7 +6107,11 @@
             <a:lstStyle/>
             <a:p>
               <a:pPr algn="ctr"/>
-              <a:endParaRPr lang="en-US"/>
+              <a:endParaRPr lang="en-US">
+                <a:solidFill>
+                  <a:schemeClr val="tx1"/>
+                </a:solidFill>
+              </a:endParaRPr>
             </a:p>
           </p:txBody>
         </p:sp>
@@ -6158,7 +6169,7 @@
             <a:blip r:embed="rId10">
               <a:extLst>
                 <a:ext uri="{96DAC541-7B7A-43D3-8B79-37D633B846F1}">
-                  <asvg:svgBlip xmlns:asvg="http://schemas.microsoft.com/office/drawing/2016/SVG/main" r:embed="rId12"/>
+                  <asvg:svgBlip xmlns:asvg="http://schemas.microsoft.com/office/drawing/2016/SVG/main" r:embed="rId11"/>
                 </a:ext>
               </a:extLst>
             </a:blip>
@@ -6199,8 +6210,9 @@
             <a:noFill/>
             <a:ln w="38100">
               <a:solidFill>
-                <a:srgbClr val="C00000"/>
+                <a:schemeClr val="tx1"/>
               </a:solidFill>
+              <a:prstDash val="sysDash"/>
             </a:ln>
           </p:spPr>
           <p:style>
@@ -6224,7 +6236,11 @@
             <a:lstStyle/>
             <a:p>
               <a:pPr algn="ctr"/>
-              <a:endParaRPr lang="en-US"/>
+              <a:endParaRPr lang="en-US">
+                <a:solidFill>
+                  <a:schemeClr val="tx1"/>
+                </a:solidFill>
+              </a:endParaRPr>
             </a:p>
           </p:txBody>
         </p:sp>

</xml_diff>